<commit_message>
Finally Done with Documentation
</commit_message>
<xml_diff>
--- a/Markdown.pptx
+++ b/Markdown.pptx
@@ -228,6 +228,7 @@
           <a:p>
             <a:fld id="{257E4D00-8F3B-4D64-A98C-31F1C299C8CF}" type="datetimeFigureOut">
               <a:rPr lang="en-US" smtClean="0"/>
+              <a:pPr/>
               <a:t>8/25/2018</a:t>
             </a:fld>
             <a:endParaRPr lang="en-US"/>
@@ -389,6 +390,7 @@
           <a:p>
             <a:fld id="{799C8A29-973B-495A-AE02-4A64ADB3C3CD}" type="slidenum">
               <a:rPr lang="en-US" smtClean="0"/>
+              <a:pPr/>
               <a:t>‹#›</a:t>
             </a:fld>
             <a:endParaRPr lang="en-US"/>
@@ -700,6 +702,7 @@
           <a:p>
             <a:fld id="{8F6AF64A-CE5B-404C-A1F7-91A1F320A7FF}" type="datetime1">
               <a:rPr lang="en-US" smtClean="0"/>
+              <a:pPr/>
               <a:t>8/25/2018</a:t>
             </a:fld>
             <a:endParaRPr lang="en-US"/>
@@ -904,6 +907,7 @@
           <a:p>
             <a:fld id="{35F9E947-CA57-4CD8-8183-1832B5956BEB}" type="datetime1">
               <a:rPr lang="en-US" smtClean="0"/>
+              <a:pPr/>
               <a:t>8/25/2018</a:t>
             </a:fld>
             <a:endParaRPr lang="en-US"/>
@@ -1147,6 +1151,7 @@
           <a:p>
             <a:fld id="{4347C576-600F-4FDD-81B1-B7E194C12438}" type="datetime1">
               <a:rPr lang="en-US" smtClean="0"/>
+              <a:pPr/>
               <a:t>8/25/2018</a:t>
             </a:fld>
             <a:endParaRPr lang="en-US"/>
@@ -1324,6 +1329,7 @@
           <a:p>
             <a:fld id="{9EE0636C-5ECC-4843-8E04-4D5AD685689B}" type="datetime1">
               <a:rPr lang="en-US" smtClean="0"/>
+              <a:pPr/>
               <a:t>8/25/2018</a:t>
             </a:fld>
             <a:endParaRPr lang="en-US"/>
@@ -1509,6 +1515,7 @@
           <a:p>
             <a:fld id="{39F1C63D-4F4E-4A44-9FF0-7DEDDEB094F6}" type="datetime1">
               <a:rPr lang="en-US" smtClean="0"/>
+              <a:pPr/>
               <a:t>8/25/2018</a:t>
             </a:fld>
             <a:endParaRPr lang="en-US"/>
@@ -1803,6 +1810,7 @@
           <a:p>
             <a:fld id="{B2E45E31-33F7-4BE3-A62E-1D7880398833}" type="datetime1">
               <a:rPr lang="en-US" smtClean="0"/>
+              <a:pPr/>
               <a:t>8/25/2018</a:t>
             </a:fld>
             <a:endParaRPr lang="en-US"/>
@@ -2219,6 +2227,7 @@
           <a:p>
             <a:fld id="{713410DD-492B-4853-9583-295C7BDB13B9}" type="datetime1">
               <a:rPr lang="en-US" smtClean="0"/>
+              <a:pPr/>
               <a:t>8/25/2018</a:t>
             </a:fld>
             <a:endParaRPr lang="en-US"/>
@@ -3158,6 +3167,7 @@
           <a:p>
             <a:fld id="{EAA44CAD-DC04-4BC8-9437-E2EC0BE3E18A}" type="datetime1">
               <a:rPr lang="en-US" smtClean="0"/>
+              <a:pPr/>
               <a:t>8/25/2018</a:t>
             </a:fld>
             <a:endParaRPr lang="en-US"/>
@@ -4081,6 +4091,7 @@
           <a:p>
             <a:fld id="{602CAED9-B7F7-4403-939E-AF83E541B53A}" type="datetime1">
               <a:rPr lang="en-US" smtClean="0"/>
+              <a:pPr/>
               <a:t>8/25/2018</a:t>
             </a:fld>
             <a:endParaRPr lang="en-US"/>
@@ -4832,6 +4843,7 @@
           <a:p>
             <a:fld id="{83773B53-2BEA-470B-A84C-A8EF29D3FFF5}" type="datetime1">
               <a:rPr lang="en-US" smtClean="0"/>
+              <a:pPr/>
               <a:t>8/25/2018</a:t>
             </a:fld>
             <a:endParaRPr lang="en-US"/>
@@ -5022,7 +5034,7 @@
         <p:spPr>
           <a:xfrm>
             <a:off x="609600" y="2362200"/>
-            <a:ext cx="11763375" cy="6314440"/>
+            <a:ext cx="11763375" cy="6715556"/>
           </a:xfrm>
           <a:prstGeom prst="rect">
             <a:avLst/>
@@ -5392,11 +5404,81 @@
               </a:spcBef>
             </a:pPr>
             <a:r>
+              <a:rPr sz="2100" spc="-5">
+                <a:latin typeface="Courier New"/>
+                <a:cs typeface="Courier New"/>
+              </a:rPr>
+              <a:t>Check </a:t>
+            </a:r>
+            <a:r>
+              <a:rPr sz="2100" spc="-5" smtClean="0">
+                <a:latin typeface="Courier New"/>
+                <a:cs typeface="Courier New"/>
+              </a:rPr>
+              <a:t>out</a:t>
+            </a:r>
+            <a:r>
+              <a:rPr lang="en-US" sz="2100" spc="-5" dirty="0" smtClean="0">
+                <a:latin typeface="Courier New"/>
+                <a:cs typeface="Courier New"/>
+              </a:rPr>
+              <a:t> My </a:t>
+            </a:r>
+            <a:r>
+              <a:rPr sz="2100" spc="-5" smtClean="0">
+                <a:latin typeface="Courier New"/>
+                <a:cs typeface="Courier New"/>
+              </a:rPr>
+              <a:t> </a:t>
+            </a:r>
+            <a:r>
+              <a:rPr sz="2100" spc="-5">
+                <a:latin typeface="Courier New"/>
+                <a:cs typeface="Courier New"/>
+              </a:rPr>
+              <a:t>[</a:t>
+            </a:r>
+            <a:r>
+              <a:rPr sz="2100" spc="-5" smtClean="0">
+                <a:latin typeface="Courier New"/>
+                <a:cs typeface="Courier New"/>
+              </a:rPr>
+              <a:t>Git</a:t>
+            </a:r>
+            <a:r>
+              <a:rPr lang="en-US" sz="2100" spc="-5" dirty="0" smtClean="0">
+                <a:latin typeface="Courier New"/>
+                <a:cs typeface="Courier New"/>
+              </a:rPr>
+              <a:t>hub</a:t>
+            </a:r>
+            <a:r>
+              <a:rPr sz="2100" spc="-5" smtClean="0">
+                <a:latin typeface="Courier New"/>
+                <a:cs typeface="Courier New"/>
+              </a:rPr>
+              <a:t>](</a:t>
+            </a:r>
+            <a:r>
+              <a:rPr lang="en-US" sz="2100" spc="-5" dirty="0" smtClean="0">
+                <a:latin typeface="Courier New"/>
+                <a:cs typeface="Courier New"/>
+              </a:rPr>
+              <a:t>https://github.com/MukeshDubey1420</a:t>
+            </a:r>
+            <a:r>
+              <a:rPr sz="2100" spc="-5" smtClean="0">
+                <a:latin typeface="Courier New"/>
+                <a:cs typeface="Courier New"/>
+              </a:rPr>
+              <a:t>) </a:t>
+            </a:r>
+            <a:r>
               <a:rPr sz="2100" spc="-5" dirty="0">
                 <a:latin typeface="Courier New"/>
                 <a:cs typeface="Courier New"/>
               </a:rPr>
-              <a:t>Check out [GitUp](http://gitup.co) for a cool way to view git</a:t>
+              <a:t>for a cool way to view git</a:t>
             </a:r>
             <a:r>
               <a:rPr sz="2100" spc="110" dirty="0">
@@ -5862,6 +5944,7 @@
           <a:p>
             <a:fld id="{B3CA2C7F-0FC0-46A2-9A07-0385A6CEF5C7}" type="datetime1">
               <a:rPr lang="en-US" smtClean="0"/>
+              <a:pPr/>
               <a:t>8/25/2018</a:t>
             </a:fld>
             <a:endParaRPr lang="en-US"/>
@@ -6052,7 +6135,7 @@
         <p:spPr>
           <a:xfrm>
             <a:off x="609600" y="2362200"/>
-            <a:ext cx="10888980" cy="3698240"/>
+            <a:ext cx="10888980" cy="2864887"/>
           </a:xfrm>
           <a:prstGeom prst="rect">
             <a:avLst/>
@@ -6230,51 +6313,61 @@
             </a:endParaRPr>
           </a:p>
           <a:p>
-            <a:pPr marL="1168400" marR="5080" lvl="2" indent="-266700">
-              <a:lnSpc>
-                <a:spcPct val="105800"/>
-              </a:lnSpc>
-              <a:spcBef>
-                <a:spcPts val="2300"/>
-              </a:spcBef>
-              <a:buChar char="•"/>
-              <a:tabLst>
-                <a:tab pos="1168400" algn="l"/>
-              </a:tabLst>
-            </a:pPr>
-            <a:r>
-              <a:rPr sz="2600" spc="-5" dirty="0">
-                <a:latin typeface="Courier New"/>
+            <a:pPr marL="914400" lvl="4"/>
+            <a:r>
+              <a:rPr lang="en-US" spc="-5" dirty="0" smtClean="0">
                 <a:cs typeface="Courier New"/>
-                <a:hlinkClick r:id="rId2"/>
-              </a:rPr>
-              <a:t>![Kitties!](http://www.pluspets.net/wp-content/ </a:t>
-            </a:r>
-            <a:r>
-              <a:rPr sz="2600" spc="-5" dirty="0">
-                <a:latin typeface="Courier New"/>
+              </a:rPr>
+              <a:t>![</a:t>
+            </a:r>
+            <a:r>
+              <a:rPr lang="en-US" spc="-5" dirty="0" err="1" smtClean="0">
                 <a:cs typeface="Courier New"/>
               </a:rPr>
-              <a:t> uploads/2011/01/Best-Cats-Photos8.jpg "So</a:t>
-            </a:r>
-            <a:r>
-              <a:rPr sz="2600" spc="114" dirty="0">
-                <a:latin typeface="Courier New"/>
+              <a:t>Mukesh</a:t>
+            </a:r>
+            <a:r>
+              <a:rPr lang="en-US" spc="-5" dirty="0" smtClean="0">
                 <a:cs typeface="Courier New"/>
               </a:rPr>
               <a:t> </a:t>
             </a:r>
             <a:r>
-              <a:rPr sz="2600" spc="-5" dirty="0">
-                <a:latin typeface="Courier New"/>
+              <a:rPr lang="en-US" spc="-5" dirty="0" err="1" smtClean="0">
                 <a:cs typeface="Courier New"/>
               </a:rPr>
-              <a:t>cute!")</a:t>
-            </a:r>
-            <a:endParaRPr sz="2600">
-              <a:latin typeface="Courier New"/>
-              <a:cs typeface="Courier New"/>
-            </a:endParaRPr>
+              <a:t>Dubey</a:t>
+            </a:r>
+            <a:r>
+              <a:rPr lang="en-US" spc="-5" dirty="0" smtClean="0">
+                <a:cs typeface="Courier New"/>
+              </a:rPr>
+              <a:t>](https://avatars1.githubusercontent.com/u/25473584?s=460&amp;v=4  "</a:t>
+            </a:r>
+            <a:r>
+              <a:rPr lang="en-US" spc="-5" dirty="0" err="1" smtClean="0">
+                <a:cs typeface="Courier New"/>
+              </a:rPr>
+              <a:t>Mukesh</a:t>
+            </a:r>
+            <a:r>
+              <a:rPr lang="en-US" spc="-5" dirty="0" smtClean="0">
+                <a:cs typeface="Courier New"/>
+              </a:rPr>
+              <a:t> </a:t>
+            </a:r>
+            <a:r>
+              <a:rPr lang="en-US" spc="-5" dirty="0" err="1" smtClean="0">
+                <a:cs typeface="Courier New"/>
+              </a:rPr>
+              <a:t>Dubey</a:t>
+            </a:r>
+            <a:r>
+              <a:rPr lang="en-US" spc="-5" dirty="0" smtClean="0">
+                <a:cs typeface="Courier New"/>
+              </a:rPr>
+              <a:t>")</a:t>
+            </a:r>
           </a:p>
         </p:txBody>
       </p:sp>
@@ -6295,6 +6388,7 @@
           <a:p>
             <a:fld id="{448E0800-414B-4E59-9E74-967892085672}" type="datetime1">
               <a:rPr lang="en-US" smtClean="0"/>
+              <a:pPr/>
               <a:t>8/25/2018</a:t>
             </a:fld>
             <a:endParaRPr lang="en-US"/>
@@ -6376,11 +6470,7 @@
           <a:p>
             <a:r>
               <a:rPr lang="en-US" dirty="0" smtClean="0"/>
-              <a:t> 	## This is an &lt;h2&gt; header format 		</a:t>
-            </a:r>
-            <a:r>
-              <a:rPr lang="en-US" dirty="0" smtClean="0"/>
-              <a:t> </a:t>
+              <a:t> 	## This is an &lt;h2&gt; header format 		 </a:t>
             </a:r>
             <a:r>
               <a:rPr lang="en-US" sz="3300" dirty="0"/>
@@ -6390,11 +6480,7 @@
           <a:p>
             <a:r>
               <a:rPr lang="en-US" dirty="0" smtClean="0"/>
-              <a:t>	### </a:t>
-            </a:r>
-            <a:r>
-              <a:rPr lang="en-US" dirty="0" smtClean="0"/>
-              <a:t>This is an &lt;h6&gt; header format 		  This is an &lt;h2&gt; header format </a:t>
+              <a:t>	### This is an &lt;h6&gt; header format 		  This is an &lt;h2&gt; header format </a:t>
             </a:r>
           </a:p>
           <a:p>
@@ -6407,11 +6493,7 @@
             </a:r>
             <a:r>
               <a:rPr lang="en-US" i="1" dirty="0" smtClean="0"/>
-              <a:t> This text will be in italics </a:t>
-            </a:r>
-            <a:r>
-              <a:rPr lang="en-US" i="1" dirty="0" smtClean="0"/>
-              <a:t>	</a:t>
+              <a:t> This text will be in italics 	</a:t>
             </a:r>
           </a:p>
           <a:p>
@@ -6433,7 +6515,6 @@
               <a:rPr lang="en-US" b="1" i="1" dirty="0" smtClean="0"/>
               <a:t>This text will be in bold and italic</a:t>
             </a:r>
-            <a:endParaRPr lang="en-US" b="1" i="1" dirty="0" smtClean="0"/>
           </a:p>
           <a:p>
             <a:r>
@@ -6571,62 +6652,57 @@
             <a:r>
               <a:rPr lang="en-US" spc="-5" dirty="0" smtClean="0">
                 <a:cs typeface="Courier New"/>
-                <a:hlinkClick r:id="rId4"/>
-              </a:rPr>
-              <a:t>![Kitties!](</a:t>
+              </a:rPr>
+              <a:t>![</a:t>
+            </a:r>
+            <a:r>
+              <a:rPr lang="en-US" spc="-5" dirty="0" err="1" smtClean="0">
+                <a:cs typeface="Courier New"/>
+              </a:rPr>
+              <a:t>Mukesh</a:t>
             </a:r>
             <a:r>
               <a:rPr lang="en-US" spc="-5" dirty="0" smtClean="0">
                 <a:cs typeface="Courier New"/>
-                <a:hlinkClick r:id="rId5"/>
-              </a:rPr>
-              <a:t>https://www.google.co.in/url?sa=i&amp;rct=j&amp;q=&amp;esrc=s&amp;source=images&amp;cd=&amp;cad=rja&amp;uact=8&amp;</a:t>
-            </a:r>
-            <a:endParaRPr lang="en-US" spc="-5" dirty="0" smtClean="0">
-              <a:cs typeface="Courier New"/>
-            </a:endParaRPr>
-          </a:p>
-          <a:p>
-            <a:pPr marL="914400" lvl="4"/>
+              </a:rPr>
+              <a:t> </a:t>
+            </a:r>
             <a:r>
               <a:rPr lang="en-US" spc="-5" dirty="0" err="1" smtClean="0">
                 <a:cs typeface="Courier New"/>
               </a:rPr>
-              <a:t>ved</a:t>
+              <a:t>Dubey</a:t>
             </a:r>
             <a:r>
               <a:rPr lang="en-US" spc="-5" dirty="0" smtClean="0">
                 <a:cs typeface="Courier New"/>
               </a:rPr>
-              <a:t>=2ahUKEwjv3aaytYbdAhXTeX0KHXzGDtAQjRx6BAgBEAU&amp;url=https%3A%2F%2Ftwitter.com%2F</a:t>
-            </a:r>
-          </a:p>
-          <a:p>
-            <a:pPr marL="914400" lvl="4"/>
+              <a:t>](https://avatars1.githubusercontent.com/u/25473584?s=460&amp;v=4  "</a:t>
+            </a:r>
+            <a:r>
+              <a:rPr lang="en-US" spc="-5" dirty="0" err="1" smtClean="0">
+                <a:cs typeface="Courier New"/>
+              </a:rPr>
+              <a:t>Mukesh</a:t>
+            </a:r>
             <a:r>
               <a:rPr lang="en-US" spc="-5" dirty="0" smtClean="0">
                 <a:cs typeface="Courier New"/>
               </a:rPr>
-              <a:t>MukeshDubey1420%2Fstatus%2F980293391668756481&amp;psig=AOvVaw0y6OAAyH6-GKLCPsg8wxvd&amp;</a:t>
-            </a:r>
-          </a:p>
-          <a:p>
-            <a:pPr marL="914400" lvl="4"/>
+              <a:t> </a:t>
+            </a:r>
             <a:r>
               <a:rPr lang="en-US" spc="-5" dirty="0" err="1" smtClean="0">
                 <a:cs typeface="Courier New"/>
               </a:rPr>
-              <a:t>ust</a:t>
+              <a:t>Dubey</a:t>
             </a:r>
             <a:r>
               <a:rPr lang="en-US" spc="-5" dirty="0" smtClean="0">
                 <a:cs typeface="Courier New"/>
               </a:rPr>
-              <a:t>=1535225110003352 “Team Decider!") </a:t>
-            </a:r>
-          </a:p>
-          <a:p>
-            <a:pPr marL="914400" lvl="4"/>
+              <a:t>")</a:t>
+            </a:r>
             <a:endParaRPr lang="en-US" sz="2600" dirty="0" smtClean="0">
               <a:latin typeface="Courier New"/>
               <a:cs typeface="Courier New"/>
@@ -6797,14 +6873,14 @@
       </p:sp>
       <p:pic>
         <p:nvPicPr>
-          <p:cNvPr id="1026" name="Picture 2" descr="Image result for mukeshdubey1420"/>
+          <p:cNvPr id="23554" name="Picture 2" descr="https://avatars1.githubusercontent.com/u/25473584?s=460&amp;v=4"/>
           <p:cNvPicPr>
             <a:picLocks noChangeAspect="1" noChangeArrowheads="1"/>
           </p:cNvPicPr>
           <p:nvPr/>
         </p:nvPicPr>
         <p:blipFill>
-          <a:blip r:embed="rId6" cstate="print"/>
+          <a:blip r:embed="rId4"/>
           <a:srcRect/>
           <a:stretch>
             <a:fillRect/>
@@ -6812,8 +6888,8 @@
         </p:blipFill>
         <p:spPr bwMode="auto">
           <a:xfrm>
-            <a:off x="10769600" y="6858000"/>
-            <a:ext cx="1676400" cy="1295400"/>
+            <a:off x="10693400" y="6553200"/>
+            <a:ext cx="1866900" cy="1790701"/>
           </a:xfrm>
           <a:prstGeom prst="rect">
             <a:avLst/>
@@ -7858,6 +7934,7 @@
           <a:p>
             <a:fld id="{031DC2E2-EFB5-4593-A66C-A0507C3AF8DB}" type="datetime1">
               <a:rPr lang="en-US" smtClean="0"/>
+              <a:pPr/>
               <a:t>8/25/2018</a:t>
             </a:fld>
             <a:endParaRPr lang="en-US"/>
@@ -8373,6 +8450,7 @@
           <a:p>
             <a:fld id="{9590851E-3084-414F-AE6E-EB4F00796648}" type="datetime1">
               <a:rPr lang="en-US" smtClean="0"/>
+              <a:pPr/>
               <a:t>8/25/2018</a:t>
             </a:fld>
             <a:endParaRPr lang="en-US"/>
@@ -9083,6 +9161,7 @@
           <a:p>
             <a:fld id="{B58EDCAE-CFA0-40E3-97A7-9F4E173B5566}" type="datetime1">
               <a:rPr lang="en-US" smtClean="0"/>
+              <a:pPr/>
               <a:t>8/25/2018</a:t>
             </a:fld>
             <a:endParaRPr lang="en-US"/>
@@ -9289,6 +9368,7 @@
           <a:p>
             <a:fld id="{899133C1-56E7-4C50-B662-0254994BEE8A}" type="datetime1">
               <a:rPr lang="en-US" smtClean="0"/>
+              <a:pPr/>
               <a:t>8/25/2018</a:t>
             </a:fld>
             <a:endParaRPr lang="en-US"/>
@@ -9596,6 +9676,7 @@
           <a:p>
             <a:fld id="{2E6C8FD4-A569-4C49-BC12-1C6E597AF836}" type="datetime1">
               <a:rPr lang="en-US" smtClean="0"/>
+              <a:pPr/>
               <a:t>8/25/2018</a:t>
             </a:fld>
             <a:endParaRPr lang="en-US"/>
@@ -10479,6 +10560,7 @@
           <a:p>
             <a:fld id="{76B3E7D6-5387-4A34-A83A-51E83FE382DF}" type="datetime1">
               <a:rPr lang="en-US" smtClean="0"/>
+              <a:pPr/>
               <a:t>8/25/2018</a:t>
             </a:fld>
             <a:endParaRPr lang="en-US"/>
@@ -11412,6 +11494,7 @@
           <a:p>
             <a:fld id="{AC8C5B60-FA75-4AC8-8AE2-11B6F4ABF543}" type="datetime1">
               <a:rPr lang="en-US" smtClean="0"/>
+              <a:pPr/>
               <a:t>8/25/2018</a:t>
             </a:fld>
             <a:endParaRPr lang="en-US"/>
@@ -12495,6 +12578,7 @@
           <a:p>
             <a:fld id="{3476F029-FB0E-4287-A3A5-3F3FA4D286B5}" type="datetime1">
               <a:rPr lang="en-US" smtClean="0"/>
+              <a:pPr/>
               <a:t>8/25/2018</a:t>
             </a:fld>
             <a:endParaRPr lang="en-US"/>
@@ -13260,6 +13344,7 @@
           <a:p>
             <a:fld id="{B7F0D515-90B8-426A-ADDA-81F2C38768A9}" type="datetime1">
               <a:rPr lang="en-US" smtClean="0"/>
+              <a:pPr/>
               <a:t>8/25/2018</a:t>
             </a:fld>
             <a:endParaRPr lang="en-US"/>
@@ -19986,6 +20071,7 @@
           <a:p>
             <a:fld id="{758E326A-E9B7-449F-A111-FA35F73B53B1}" type="datetime1">
               <a:rPr lang="en-US" smtClean="0"/>
+              <a:pPr/>
               <a:t>8/25/2018</a:t>
             </a:fld>
             <a:endParaRPr lang="en-US"/>
@@ -20941,6 +21027,7 @@
           <a:p>
             <a:fld id="{CC04E966-99B7-4015-8351-7FEA78F04E5E}" type="datetime1">
               <a:rPr lang="en-US" smtClean="0"/>
+              <a:pPr/>
               <a:t>8/25/2018</a:t>
             </a:fld>
             <a:endParaRPr lang="en-US"/>
@@ -21540,6 +21627,7 @@
           <a:p>
             <a:fld id="{BDAD203B-93EC-4140-A688-F868413C9EF1}" type="datetime1">
               <a:rPr lang="en-US" smtClean="0"/>
+              <a:pPr/>
               <a:t>8/25/2018</a:t>
             </a:fld>
             <a:endParaRPr lang="en-US"/>
@@ -21895,6 +21983,7 @@
           <a:p>
             <a:fld id="{5DEA9595-70E4-48EB-8588-17AACBB33C2E}" type="datetime1">
               <a:rPr lang="en-US" smtClean="0"/>
+              <a:pPr/>
               <a:t>8/25/2018</a:t>
             </a:fld>
             <a:endParaRPr lang="en-US"/>
@@ -22564,6 +22653,7 @@
           <a:p>
             <a:fld id="{B98E0754-30D8-4790-AD43-97466B6FB9D3}" type="datetime1">
               <a:rPr lang="en-US" smtClean="0"/>
+              <a:pPr/>
               <a:t>8/25/2018</a:t>
             </a:fld>
             <a:endParaRPr lang="en-US"/>
@@ -22775,6 +22865,7 @@
           <a:p>
             <a:fld id="{9AACBDF7-26CD-4D30-A61B-50756E8D3DE4}" type="datetime1">
               <a:rPr lang="en-US" smtClean="0"/>
+              <a:pPr/>
               <a:t>8/25/2018</a:t>
             </a:fld>
             <a:endParaRPr lang="en-US"/>
@@ -23428,6 +23519,7 @@
           <a:p>
             <a:fld id="{D57CF21D-F590-44C7-BFC2-B519C1B17F6E}" type="datetime1">
               <a:rPr lang="en-US" smtClean="0"/>
+              <a:pPr/>
               <a:t>8/25/2018</a:t>
             </a:fld>
             <a:endParaRPr lang="en-US"/>
@@ -24158,6 +24250,7 @@
           <a:p>
             <a:fld id="{9E752EEA-96F2-4C7A-A6BB-54D53A105D5B}" type="datetime1">
               <a:rPr lang="en-US" smtClean="0"/>
+              <a:pPr/>
               <a:t>8/25/2018</a:t>
             </a:fld>
             <a:endParaRPr lang="en-US"/>
@@ -25236,6 +25329,7 @@
           <a:p>
             <a:fld id="{F611FC7E-48C3-4B50-8BA7-CBE8AF1911F1}" type="datetime1">
               <a:rPr lang="en-US" smtClean="0"/>
+              <a:pPr/>
               <a:t>8/25/2018</a:t>
             </a:fld>
             <a:endParaRPr lang="en-US"/>
@@ -26325,6 +26419,7 @@
           <a:p>
             <a:fld id="{E5063DE9-42EA-49EA-8E21-893A91CBF9DA}" type="datetime1">
               <a:rPr lang="en-US" smtClean="0"/>
+              <a:pPr/>
               <a:t>8/25/2018</a:t>
             </a:fld>
             <a:endParaRPr lang="en-US"/>
@@ -27251,6 +27346,7 @@
           <a:p>
             <a:fld id="{14744AB6-A083-4053-84BF-06CA55D1BDFD}" type="datetime1">
               <a:rPr lang="en-US" smtClean="0"/>
+              <a:pPr/>
               <a:t>8/25/2018</a:t>
             </a:fld>
             <a:endParaRPr lang="en-US"/>
@@ -28332,6 +28428,7 @@
           <a:p>
             <a:fld id="{F19BD0D9-4A29-431B-A555-2F8533E7D462}" type="datetime1">
               <a:rPr lang="en-US" smtClean="0"/>
+              <a:pPr/>
               <a:t>8/25/2018</a:t>
             </a:fld>
             <a:endParaRPr lang="en-US"/>
@@ -29262,6 +29359,7 @@
           <a:p>
             <a:fld id="{4F477C28-4649-489D-A7C6-F7016CA2E588}" type="datetime1">
               <a:rPr lang="en-US" smtClean="0"/>
+              <a:pPr/>
               <a:t>8/25/2018</a:t>
             </a:fld>
             <a:endParaRPr lang="en-US"/>
@@ -29489,6 +29587,7 @@
           <a:p>
             <a:fld id="{73912931-5E21-4150-B946-9ED74D610A79}" type="datetime1">
               <a:rPr lang="en-US" smtClean="0"/>
+              <a:pPr/>
               <a:t>8/25/2018</a:t>
             </a:fld>
             <a:endParaRPr lang="en-US"/>
@@ -30545,6 +30644,7 @@
           <a:p>
             <a:fld id="{3B2510A1-7C70-43AC-8613-471E99869B71}" type="datetime1">
               <a:rPr lang="en-US" smtClean="0"/>
+              <a:pPr/>
               <a:t>8/25/2018</a:t>
             </a:fld>
             <a:endParaRPr lang="en-US"/>
@@ -31815,6 +31915,7 @@
           <a:p>
             <a:fld id="{12D9259B-0092-42A8-9DDF-9A201F14C84F}" type="datetime1">
               <a:rPr lang="en-US" smtClean="0"/>
+              <a:pPr/>
               <a:t>8/25/2018</a:t>
             </a:fld>
             <a:endParaRPr lang="en-US"/>
@@ -32255,21 +32356,28 @@
                 <a:latin typeface="Arial"/>
                 <a:cs typeface="Arial"/>
               </a:rPr>
-              <a:t>(</a:t>
+              <a:t>(Atom, </a:t>
             </a:r>
             <a:r>
               <a:rPr lang="en-US" sz="2600" spc="-5" dirty="0" err="1" smtClean="0">
                 <a:latin typeface="Arial"/>
                 <a:cs typeface="Arial"/>
               </a:rPr>
-              <a:t>Atom,Jupyter</a:t>
+              <a:t>Jupyter</a:t>
             </a:r>
             <a:r>
               <a:rPr lang="en-US" sz="2600" spc="-5" dirty="0" smtClean="0">
                 <a:latin typeface="Arial"/>
                 <a:cs typeface="Arial"/>
               </a:rPr>
-              <a:t> Notebook)</a:t>
+              <a:t> </a:t>
+            </a:r>
+            <a:r>
+              <a:rPr lang="en-US" sz="2600" spc="-5" dirty="0" smtClean="0">
+                <a:latin typeface="Arial"/>
+                <a:cs typeface="Arial"/>
+              </a:rPr>
+              <a:t>Notebook)</a:t>
             </a:r>
             <a:endParaRPr sz="2600">
               <a:latin typeface="Arial"/>
@@ -32683,6 +32791,7 @@
           <a:p>
             <a:fld id="{6C9983B8-3C28-4CC2-99FD-B1F45D7E23CD}" type="datetime1">
               <a:rPr lang="en-US" smtClean="0"/>
+              <a:pPr/>
               <a:t>8/25/2018</a:t>
             </a:fld>
             <a:endParaRPr lang="en-US"/>
@@ -33595,6 +33704,7 @@
           <a:p>
             <a:fld id="{677FF475-24DA-44EA-9FFA-6BF1B3E6C3F4}" type="datetime1">
               <a:rPr lang="en-US" smtClean="0"/>
+              <a:pPr/>
               <a:t>8/25/2018</a:t>
             </a:fld>
             <a:endParaRPr lang="en-US"/>
@@ -34667,6 +34777,7 @@
           <a:p>
             <a:fld id="{658EFF8C-DBDD-4601-90C4-C4542CAD8AE1}" type="datetime1">
               <a:rPr lang="en-US" smtClean="0"/>
+              <a:pPr/>
               <a:t>8/25/2018</a:t>
             </a:fld>
             <a:endParaRPr lang="en-US"/>
@@ -35509,6 +35620,7 @@
           <a:p>
             <a:fld id="{3F673444-0A11-4081-87E3-104E5E9FDDA4}" type="datetime1">
               <a:rPr lang="en-US" smtClean="0"/>
+              <a:pPr/>
               <a:t>8/25/2018</a:t>
             </a:fld>
             <a:endParaRPr lang="en-US"/>
@@ -36316,6 +36428,7 @@
           <a:p>
             <a:fld id="{1C82EE60-FA9F-46E0-923C-F805B63F7DBE}" type="datetime1">
               <a:rPr lang="en-US" smtClean="0"/>
+              <a:pPr/>
               <a:t>8/25/2018</a:t>
             </a:fld>
             <a:endParaRPr lang="en-US"/>

</xml_diff>